<commit_message>
edit final presentation ppt
</commit_message>
<xml_diff>
--- a/Final Presentaion.pptx
+++ b/Final Presentaion.pptx
@@ -13,8 +13,11 @@
     <p:sldId id="263" r:id="rId7"/>
     <p:sldId id="257" r:id="rId8"/>
     <p:sldId id="262" r:id="rId9"/>
-    <p:sldId id="264" r:id="rId10"/>
-    <p:sldId id="265" r:id="rId11"/>
+    <p:sldId id="266" r:id="rId10"/>
+    <p:sldId id="267" r:id="rId11"/>
+    <p:sldId id="268" r:id="rId12"/>
+    <p:sldId id="264" r:id="rId13"/>
+    <p:sldId id="265" r:id="rId14"/>
   </p:sldIdLst>
   <p:sldSz cx="12192000" cy="6858000"/>
   <p:notesSz cx="6858000" cy="9144000"/>
@@ -113,6 +116,11 @@
       </a:defRPr>
     </a:lvl9pPr>
   </p:defaultTextStyle>
+  <p:extLst>
+    <p:ext uri="{EFAFB233-063F-42B5-8137-9DF3F51BA10A}">
+      <p15:sldGuideLst xmlns:p15="http://schemas.microsoft.com/office/powerpoint/2012/main"/>
+    </p:ext>
+  </p:extLst>
 </p:presentation>
 </file>
 
@@ -839,7 +847,7 @@
             <a:fld id="{B61BEF0D-F0BB-DE4B-95CE-6DB70DBA9567}" type="datetimeFigureOut">
               <a:rPr lang="en-US" dirty="0"/>
               <a:pPr/>
-              <a:t>4/16/2019</a:t>
+              <a:t>4/17/2019</a:t>
             </a:fld>
             <a:endParaRPr lang="en-US" dirty="0"/>
           </a:p>
@@ -1087,7 +1095,7 @@
             <a:fld id="{B61BEF0D-F0BB-DE4B-95CE-6DB70DBA9567}" type="datetimeFigureOut">
               <a:rPr lang="en-US" dirty="0"/>
               <a:pPr/>
-              <a:t>4/16/2019</a:t>
+              <a:t>4/17/2019</a:t>
             </a:fld>
             <a:endParaRPr lang="en-US" dirty="0"/>
           </a:p>
@@ -1398,7 +1406,7 @@
             <a:fld id="{B61BEF0D-F0BB-DE4B-95CE-6DB70DBA9567}" type="datetimeFigureOut">
               <a:rPr lang="en-US" dirty="0"/>
               <a:pPr/>
-              <a:t>4/16/2019</a:t>
+              <a:t>4/17/2019</a:t>
             </a:fld>
             <a:endParaRPr lang="en-US" dirty="0"/>
           </a:p>
@@ -1736,7 +1744,7 @@
             <a:fld id="{B61BEF0D-F0BB-DE4B-95CE-6DB70DBA9567}" type="datetimeFigureOut">
               <a:rPr lang="en-US" dirty="0"/>
               <a:pPr/>
-              <a:t>4/16/2019</a:t>
+              <a:t>4/17/2019</a:t>
             </a:fld>
             <a:endParaRPr lang="en-US" dirty="0"/>
           </a:p>
@@ -2047,7 +2055,7 @@
             <a:fld id="{B61BEF0D-F0BB-DE4B-95CE-6DB70DBA9567}" type="datetimeFigureOut">
               <a:rPr lang="en-US" dirty="0"/>
               <a:pPr/>
-              <a:t>4/16/2019</a:t>
+              <a:t>4/17/2019</a:t>
             </a:fld>
             <a:endParaRPr lang="en-US" dirty="0"/>
           </a:p>
@@ -2437,7 +2445,7 @@
             <a:fld id="{B61BEF0D-F0BB-DE4B-95CE-6DB70DBA9567}" type="datetimeFigureOut">
               <a:rPr lang="en-US" dirty="0"/>
               <a:pPr/>
-              <a:t>4/16/2019</a:t>
+              <a:t>4/17/2019</a:t>
             </a:fld>
             <a:endParaRPr lang="en-US" dirty="0"/>
           </a:p>
@@ -2603,7 +2611,7 @@
           <a:p>
             <a:fld id="{55C6B4A9-1611-4792-9094-5F34BCA07E0B}" type="datetimeFigureOut">
               <a:rPr lang="en-US" dirty="0"/>
-              <a:t>4/16/2019</a:t>
+              <a:t>4/17/2019</a:t>
             </a:fld>
             <a:endParaRPr lang="en-US" dirty="0"/>
           </a:p>
@@ -2779,7 +2787,7 @@
             <a:fld id="{B61BEF0D-F0BB-DE4B-95CE-6DB70DBA9567}" type="datetimeFigureOut">
               <a:rPr lang="en-US" dirty="0"/>
               <a:pPr/>
-              <a:t>4/16/2019</a:t>
+              <a:t>4/17/2019</a:t>
             </a:fld>
             <a:endParaRPr lang="en-US" dirty="0"/>
           </a:p>
@@ -2952,7 +2960,7 @@
             <a:fld id="{B61BEF0D-F0BB-DE4B-95CE-6DB70DBA9567}" type="datetimeFigureOut">
               <a:rPr lang="en-US" dirty="0"/>
               <a:pPr/>
-              <a:t>4/16/2019</a:t>
+              <a:t>4/17/2019</a:t>
             </a:fld>
             <a:endParaRPr lang="en-US" dirty="0"/>
           </a:p>
@@ -3196,7 +3204,7 @@
             <a:fld id="{B61BEF0D-F0BB-DE4B-95CE-6DB70DBA9567}" type="datetimeFigureOut">
               <a:rPr lang="en-US" dirty="0"/>
               <a:pPr/>
-              <a:t>4/16/2019</a:t>
+              <a:t>4/17/2019</a:t>
             </a:fld>
             <a:endParaRPr lang="en-US" dirty="0"/>
           </a:p>
@@ -3424,7 +3432,7 @@
           <a:p>
             <a:fld id="{EB712588-04B1-427B-82EE-E8DB90309F08}" type="datetimeFigureOut">
               <a:rPr lang="en-US" dirty="0"/>
-              <a:t>4/16/2019</a:t>
+              <a:t>4/17/2019</a:t>
             </a:fld>
             <a:endParaRPr lang="en-US" dirty="0"/>
           </a:p>
@@ -3794,7 +3802,7 @@
             <a:fld id="{B61BEF0D-F0BB-DE4B-95CE-6DB70DBA9567}" type="datetimeFigureOut">
               <a:rPr lang="en-US" dirty="0"/>
               <a:pPr/>
-              <a:t>4/16/2019</a:t>
+              <a:t>4/17/2019</a:t>
             </a:fld>
             <a:endParaRPr lang="en-US" dirty="0"/>
           </a:p>
@@ -3914,7 +3922,7 @@
             <a:fld id="{B61BEF0D-F0BB-DE4B-95CE-6DB70DBA9567}" type="datetimeFigureOut">
               <a:rPr lang="en-US" dirty="0"/>
               <a:pPr/>
-              <a:t>4/16/2019</a:t>
+              <a:t>4/17/2019</a:t>
             </a:fld>
             <a:endParaRPr lang="en-US" dirty="0"/>
           </a:p>
@@ -4006,7 +4014,7 @@
             <a:fld id="{B61BEF0D-F0BB-DE4B-95CE-6DB70DBA9567}" type="datetimeFigureOut">
               <a:rPr lang="en-US" dirty="0"/>
               <a:pPr/>
-              <a:t>4/16/2019</a:t>
+              <a:t>4/17/2019</a:t>
             </a:fld>
             <a:endParaRPr lang="en-US" dirty="0"/>
           </a:p>
@@ -4257,7 +4265,7 @@
           <a:p>
             <a:fld id="{42A54C80-263E-416B-A8E0-580EDEADCBDC}" type="datetimeFigureOut">
               <a:rPr lang="en-US" dirty="0"/>
-              <a:t>4/16/2019</a:t>
+              <a:t>4/17/2019</a:t>
             </a:fld>
             <a:endParaRPr lang="en-US" dirty="0"/>
           </a:p>
@@ -4516,7 +4524,7 @@
             <a:fld id="{B61BEF0D-F0BB-DE4B-95CE-6DB70DBA9567}" type="datetimeFigureOut">
               <a:rPr lang="en-US" dirty="0"/>
               <a:pPr/>
-              <a:t>4/16/2019</a:t>
+              <a:t>4/17/2019</a:t>
             </a:fld>
             <a:endParaRPr lang="en-US" dirty="0"/>
           </a:p>
@@ -5256,7 +5264,7 @@
             <a:fld id="{B61BEF0D-F0BB-DE4B-95CE-6DB70DBA9567}" type="datetimeFigureOut">
               <a:rPr lang="en-US" dirty="0"/>
               <a:pPr/>
-              <a:t>4/16/2019</a:t>
+              <a:t>4/17/2019</a:t>
             </a:fld>
             <a:endParaRPr lang="en-US" dirty="0"/>
           </a:p>
@@ -5891,6 +5899,1799 @@
           <p:cNvPr id="2" name="Title 1">
             <a:extLst>
               <a:ext uri="{FF2B5EF4-FFF2-40B4-BE49-F238E27FC236}">
+                <a16:creationId xmlns:a16="http://schemas.microsoft.com/office/drawing/2014/main" id="{28CA6752-C54C-45AF-B016-68AC7834C41E}"/>
+              </a:ext>
+            </a:extLst>
+          </p:cNvPr>
+          <p:cNvSpPr>
+            <a:spLocks noGrp="1"/>
+          </p:cNvSpPr>
+          <p:nvPr>
+            <p:ph type="title"/>
+          </p:nvPr>
+        </p:nvSpPr>
+        <p:spPr/>
+        <p:txBody>
+          <a:bodyPr/>
+          <a:lstStyle/>
+          <a:p>
+            <a:r>
+              <a:rPr lang="en-US" dirty="0"/>
+              <a:t>Project Demo – data </a:t>
+            </a:r>
+            <a:r>
+              <a:rPr lang="en-US" dirty="0" err="1"/>
+              <a:t>pras</a:t>
+            </a:r>
+            <a:r>
+              <a:rPr lang="en-US" altLang="zh-CN" dirty="0" err="1"/>
+              <a:t>e</a:t>
+            </a:r>
+            <a:endParaRPr lang="en-US" dirty="0"/>
+          </a:p>
+        </p:txBody>
+      </p:sp>
+      <p:sp>
+        <p:nvSpPr>
+          <p:cNvPr id="3" name="Content Placeholder 2">
+            <a:extLst>
+              <a:ext uri="{FF2B5EF4-FFF2-40B4-BE49-F238E27FC236}">
+                <a16:creationId xmlns:a16="http://schemas.microsoft.com/office/drawing/2014/main" id="{8F68AAB9-BBDE-45D6-B459-2980C68F1064}"/>
+              </a:ext>
+            </a:extLst>
+          </p:cNvPr>
+          <p:cNvSpPr>
+            <a:spLocks noGrp="1"/>
+          </p:cNvSpPr>
+          <p:nvPr>
+            <p:ph idx="1"/>
+          </p:nvPr>
+        </p:nvSpPr>
+        <p:spPr/>
+        <p:txBody>
+          <a:bodyPr/>
+          <a:lstStyle/>
+          <a:p>
+            <a:r>
+              <a:rPr lang="en-US" dirty="0"/>
+              <a:t>For input data, we use sparkSession.read.csv method with “head” and “</a:t>
+            </a:r>
+            <a:r>
+              <a:rPr lang="en-US" dirty="0" err="1"/>
+              <a:t>inferSchema</a:t>
+            </a:r>
+            <a:r>
+              <a:rPr lang="en-US" dirty="0"/>
+              <a:t>” options to create a taxi fare training </a:t>
+            </a:r>
+            <a:r>
+              <a:rPr lang="en-US" dirty="0" err="1"/>
+              <a:t>DataFrame</a:t>
+            </a:r>
+            <a:endParaRPr lang="en-US" dirty="0"/>
+          </a:p>
+          <a:p>
+            <a:r>
+              <a:rPr lang="en-US" dirty="0"/>
+              <a:t>In order to get rid of invalid data, we filter out the row with the feature column equals zero.</a:t>
+            </a:r>
+          </a:p>
+          <a:p>
+            <a:r>
+              <a:rPr lang="en-US" dirty="0"/>
+              <a:t>To GBT algorithm model in spark ml library, the input feature col and label col should only be one. In order to make our four features data able to input this model, we use </a:t>
+            </a:r>
+            <a:r>
+              <a:rPr lang="en-US" dirty="0" err="1"/>
+              <a:t>VectorAssembler</a:t>
+            </a:r>
+            <a:r>
+              <a:rPr lang="en-US" dirty="0"/>
+              <a:t> to transform original </a:t>
+            </a:r>
+            <a:r>
+              <a:rPr lang="en-US" dirty="0" err="1"/>
+              <a:t>dataFrame</a:t>
+            </a:r>
+            <a:r>
+              <a:rPr lang="en-US" dirty="0"/>
+              <a:t> into a new </a:t>
+            </a:r>
+            <a:r>
+              <a:rPr lang="en-US" dirty="0" err="1"/>
+              <a:t>DataFrame</a:t>
+            </a:r>
+            <a:r>
+              <a:rPr lang="en-US" dirty="0"/>
+              <a:t> with only one vector feature.</a:t>
+            </a:r>
+          </a:p>
+          <a:p>
+            <a:r>
+              <a:rPr lang="en-US" dirty="0"/>
+              <a:t>Then, we create a Pipeline to specify our ML workflow and use fit method to generate training model with new </a:t>
+            </a:r>
+            <a:r>
+              <a:rPr lang="en-US" dirty="0" err="1"/>
+              <a:t>dataFrame</a:t>
+            </a:r>
+            <a:r>
+              <a:rPr lang="en-US" dirty="0"/>
+              <a:t>.</a:t>
+            </a:r>
+          </a:p>
+        </p:txBody>
+      </p:sp>
+    </p:spTree>
+    <p:extLst>
+      <p:ext uri="{BB962C8B-B14F-4D97-AF65-F5344CB8AC3E}">
+        <p14:creationId xmlns:p14="http://schemas.microsoft.com/office/powerpoint/2010/main" val="3686578956"/>
+      </p:ext>
+    </p:extLst>
+  </p:cSld>
+  <p:clrMapOvr>
+    <a:masterClrMapping/>
+  </p:clrMapOvr>
+</p:sld>
+</file>
+
+<file path=ppt/slides/slide11.xml><?xml version="1.0" encoding="utf-8"?>
+<p:sld xmlns:a="http://schemas.openxmlformats.org/drawingml/2006/main" xmlns:r="http://schemas.openxmlformats.org/officeDocument/2006/relationships" xmlns:p="http://schemas.openxmlformats.org/presentationml/2006/main">
+  <p:cSld>
+    <p:bg>
+      <p:bgPr>
+        <a:solidFill>
+          <a:schemeClr val="bg1"/>
+        </a:solidFill>
+        <a:effectLst/>
+      </p:bgPr>
+    </p:bg>
+    <p:spTree>
+      <p:nvGrpSpPr>
+        <p:cNvPr id="1" name=""/>
+        <p:cNvGrpSpPr/>
+        <p:nvPr/>
+      </p:nvGrpSpPr>
+      <p:grpSpPr>
+        <a:xfrm>
+          <a:off x="0" y="0"/>
+          <a:ext cx="0" cy="0"/>
+          <a:chOff x="0" y="0"/>
+          <a:chExt cx="0" cy="0"/>
+        </a:xfrm>
+      </p:grpSpPr>
+      <p:grpSp>
+        <p:nvGrpSpPr>
+          <p:cNvPr id="37" name="Group 9">
+            <a:extLst>
+              <a:ext uri="{FF2B5EF4-FFF2-40B4-BE49-F238E27FC236}">
+                <a16:creationId xmlns:a16="http://schemas.microsoft.com/office/drawing/2014/main" id="{609316A9-990D-4EC3-A671-70EE5C1493A4}"/>
+              </a:ext>
+              <a:ext uri="{C183D7F6-B498-43B3-948B-1728B52AA6E4}">
+                <adec:decorative xmlns:adec="http://schemas.microsoft.com/office/drawing/2017/decorative" val="1"/>
+              </a:ext>
+            </a:extLst>
+          </p:cNvPr>
+          <p:cNvGrpSpPr>
+            <a:grpSpLocks noGrp="1" noUngrp="1" noRot="1" noChangeAspect="1" noMove="1" noResize="1"/>
+          </p:cNvGrpSpPr>
+          <p:nvPr>
+            <p:extLst>
+              <p:ext uri="{386F3935-93C4-4BCD-93E2-E3B085C9AB24}">
+                <p16:designElem xmlns:p16="http://schemas.microsoft.com/office/powerpoint/2015/main" val="1"/>
+              </p:ext>
+            </p:extLst>
+          </p:nvPr>
+        </p:nvGrpSpPr>
+        <p:grpSpPr>
+          <a:xfrm>
+            <a:off x="0" y="-8467"/>
+            <a:ext cx="12192000" cy="6866467"/>
+            <a:chOff x="0" y="-8467"/>
+            <a:chExt cx="12192000" cy="6866467"/>
+          </a:xfrm>
+        </p:grpSpPr>
+        <p:cxnSp>
+          <p:nvCxnSpPr>
+            <p:cNvPr id="11" name="Straight Connector 10">
+              <a:extLst>
+                <a:ext uri="{FF2B5EF4-FFF2-40B4-BE49-F238E27FC236}">
+                  <a16:creationId xmlns:a16="http://schemas.microsoft.com/office/drawing/2014/main" id="{9B0C6109-9159-49CA-AD7A-F9035539DB7F}"/>
+                </a:ext>
+                <a:ext uri="{C183D7F6-B498-43B3-948B-1728B52AA6E4}">
+                  <adec:decorative xmlns:adec="http://schemas.microsoft.com/office/drawing/2017/decorative" val="1"/>
+                </a:ext>
+              </a:extLst>
+            </p:cNvPr>
+            <p:cNvCxnSpPr/>
+            <p:nvPr>
+              <p:extLst>
+                <p:ext uri="{386F3935-93C4-4BCD-93E2-E3B085C9AB24}">
+                  <p16:designElem xmlns:p16="http://schemas.microsoft.com/office/powerpoint/2015/main" val="1"/>
+                </p:ext>
+              </p:extLst>
+            </p:nvPr>
+          </p:nvCxnSpPr>
+          <p:spPr>
+            <a:xfrm>
+              <a:off x="9371012" y="0"/>
+              <a:ext cx="1219200" cy="6858000"/>
+            </a:xfrm>
+            <a:prstGeom prst="line">
+              <a:avLst/>
+            </a:prstGeom>
+            <a:ln w="9525">
+              <a:solidFill>
+                <a:schemeClr val="bg1">
+                  <a:lumMod val="75000"/>
+                </a:schemeClr>
+              </a:solidFill>
+            </a:ln>
+          </p:spPr>
+          <p:style>
+            <a:lnRef idx="2">
+              <a:schemeClr val="accent1"/>
+            </a:lnRef>
+            <a:fillRef idx="0">
+              <a:schemeClr val="accent1"/>
+            </a:fillRef>
+            <a:effectRef idx="1">
+              <a:schemeClr val="accent1"/>
+            </a:effectRef>
+            <a:fontRef idx="minor">
+              <a:schemeClr val="tx1"/>
+            </a:fontRef>
+          </p:style>
+        </p:cxnSp>
+        <p:cxnSp>
+          <p:nvCxnSpPr>
+            <p:cNvPr id="12" name="Straight Connector 11">
+              <a:extLst>
+                <a:ext uri="{FF2B5EF4-FFF2-40B4-BE49-F238E27FC236}">
+                  <a16:creationId xmlns:a16="http://schemas.microsoft.com/office/drawing/2014/main" id="{686F14F5-308C-4EB6-87AB-05DE9501B1AA}"/>
+                </a:ext>
+                <a:ext uri="{C183D7F6-B498-43B3-948B-1728B52AA6E4}">
+                  <adec:decorative xmlns:adec="http://schemas.microsoft.com/office/drawing/2017/decorative" val="1"/>
+                </a:ext>
+              </a:extLst>
+            </p:cNvPr>
+            <p:cNvCxnSpPr/>
+            <p:nvPr>
+              <p:extLst>
+                <p:ext uri="{386F3935-93C4-4BCD-93E2-E3B085C9AB24}">
+                  <p16:designElem xmlns:p16="http://schemas.microsoft.com/office/powerpoint/2015/main" val="1"/>
+                </p:ext>
+              </p:extLst>
+            </p:nvPr>
+          </p:nvCxnSpPr>
+          <p:spPr>
+            <a:xfrm flipH="1">
+              <a:off x="7425267" y="3681413"/>
+              <a:ext cx="4763558" cy="3176587"/>
+            </a:xfrm>
+            <a:prstGeom prst="line">
+              <a:avLst/>
+            </a:prstGeom>
+            <a:ln w="9525">
+              <a:solidFill>
+                <a:schemeClr val="bg1">
+                  <a:lumMod val="85000"/>
+                </a:schemeClr>
+              </a:solidFill>
+            </a:ln>
+          </p:spPr>
+          <p:style>
+            <a:lnRef idx="2">
+              <a:schemeClr val="accent1"/>
+            </a:lnRef>
+            <a:fillRef idx="0">
+              <a:schemeClr val="accent1"/>
+            </a:fillRef>
+            <a:effectRef idx="1">
+              <a:schemeClr val="accent1"/>
+            </a:effectRef>
+            <a:fontRef idx="minor">
+              <a:schemeClr val="tx1"/>
+            </a:fontRef>
+          </p:style>
+        </p:cxnSp>
+        <p:sp>
+          <p:nvSpPr>
+            <p:cNvPr id="13" name="Rectangle 23">
+              <a:extLst>
+                <a:ext uri="{FF2B5EF4-FFF2-40B4-BE49-F238E27FC236}">
+                  <a16:creationId xmlns:a16="http://schemas.microsoft.com/office/drawing/2014/main" id="{BA032363-A188-47C5-9D59-9B788809DCD2}"/>
+                </a:ext>
+                <a:ext uri="{C183D7F6-B498-43B3-948B-1728B52AA6E4}">
+                  <adec:decorative xmlns:adec="http://schemas.microsoft.com/office/drawing/2017/decorative" val="1"/>
+                </a:ext>
+              </a:extLst>
+            </p:cNvPr>
+            <p:cNvSpPr/>
+            <p:nvPr>
+              <p:extLst>
+                <p:ext uri="{386F3935-93C4-4BCD-93E2-E3B085C9AB24}">
+                  <p16:designElem xmlns:p16="http://schemas.microsoft.com/office/powerpoint/2015/main" val="1"/>
+                </p:ext>
+              </p:extLst>
+            </p:nvPr>
+          </p:nvSpPr>
+          <p:spPr>
+            <a:xfrm>
+              <a:off x="9181476" y="-8467"/>
+              <a:ext cx="3007349" cy="6866467"/>
+            </a:xfrm>
+            <a:custGeom>
+              <a:avLst/>
+              <a:gdLst/>
+              <a:ahLst/>
+              <a:cxnLst/>
+              <a:rect l="l" t="t" r="r" b="b"/>
+              <a:pathLst>
+                <a:path w="3007349" h="6866467">
+                  <a:moveTo>
+                    <a:pt x="2045532" y="0"/>
+                  </a:moveTo>
+                  <a:lnTo>
+                    <a:pt x="3007349" y="0"/>
+                  </a:lnTo>
+                  <a:lnTo>
+                    <a:pt x="3007349" y="6866467"/>
+                  </a:lnTo>
+                  <a:lnTo>
+                    <a:pt x="0" y="6866467"/>
+                  </a:lnTo>
+                  <a:lnTo>
+                    <a:pt x="2045532" y="0"/>
+                  </a:lnTo>
+                  <a:close/>
+                </a:path>
+              </a:pathLst>
+            </a:custGeom>
+            <a:solidFill>
+              <a:schemeClr val="accent1">
+                <a:alpha val="30000"/>
+              </a:schemeClr>
+            </a:solidFill>
+            <a:ln>
+              <a:noFill/>
+            </a:ln>
+            <a:effectLst/>
+          </p:spPr>
+          <p:style>
+            <a:lnRef idx="1">
+              <a:schemeClr val="accent1"/>
+            </a:lnRef>
+            <a:fillRef idx="3">
+              <a:schemeClr val="accent1"/>
+            </a:fillRef>
+            <a:effectRef idx="2">
+              <a:schemeClr val="accent1"/>
+            </a:effectRef>
+            <a:fontRef idx="minor">
+              <a:schemeClr val="lt1"/>
+            </a:fontRef>
+          </p:style>
+        </p:sp>
+        <p:sp>
+          <p:nvSpPr>
+            <p:cNvPr id="14" name="Rectangle 25">
+              <a:extLst>
+                <a:ext uri="{FF2B5EF4-FFF2-40B4-BE49-F238E27FC236}">
+                  <a16:creationId xmlns:a16="http://schemas.microsoft.com/office/drawing/2014/main" id="{2C4077DF-6BB9-4069-AD28-6B1664EBB064}"/>
+                </a:ext>
+                <a:ext uri="{C183D7F6-B498-43B3-948B-1728B52AA6E4}">
+                  <adec:decorative xmlns:adec="http://schemas.microsoft.com/office/drawing/2017/decorative" val="1"/>
+                </a:ext>
+              </a:extLst>
+            </p:cNvPr>
+            <p:cNvSpPr/>
+            <p:nvPr>
+              <p:extLst>
+                <p:ext uri="{386F3935-93C4-4BCD-93E2-E3B085C9AB24}">
+                  <p16:designElem xmlns:p16="http://schemas.microsoft.com/office/powerpoint/2015/main" val="1"/>
+                </p:ext>
+              </p:extLst>
+            </p:nvPr>
+          </p:nvSpPr>
+          <p:spPr>
+            <a:xfrm>
+              <a:off x="9603442" y="-8467"/>
+              <a:ext cx="2588558" cy="6866467"/>
+            </a:xfrm>
+            <a:custGeom>
+              <a:avLst/>
+              <a:gdLst/>
+              <a:ahLst/>
+              <a:cxnLst/>
+              <a:rect l="l" t="t" r="r" b="b"/>
+              <a:pathLst>
+                <a:path w="2573311" h="6866467">
+                  <a:moveTo>
+                    <a:pt x="0" y="0"/>
+                  </a:moveTo>
+                  <a:lnTo>
+                    <a:pt x="2573311" y="0"/>
+                  </a:lnTo>
+                  <a:lnTo>
+                    <a:pt x="2573311" y="6866467"/>
+                  </a:lnTo>
+                  <a:lnTo>
+                    <a:pt x="1202336" y="6866467"/>
+                  </a:lnTo>
+                  <a:lnTo>
+                    <a:pt x="0" y="0"/>
+                  </a:lnTo>
+                  <a:close/>
+                </a:path>
+              </a:pathLst>
+            </a:custGeom>
+            <a:solidFill>
+              <a:schemeClr val="accent1">
+                <a:alpha val="20000"/>
+              </a:schemeClr>
+            </a:solidFill>
+            <a:ln>
+              <a:noFill/>
+            </a:ln>
+            <a:effectLst/>
+          </p:spPr>
+          <p:style>
+            <a:lnRef idx="1">
+              <a:schemeClr val="accent1"/>
+            </a:lnRef>
+            <a:fillRef idx="3">
+              <a:schemeClr val="accent1"/>
+            </a:fillRef>
+            <a:effectRef idx="2">
+              <a:schemeClr val="accent1"/>
+            </a:effectRef>
+            <a:fontRef idx="minor">
+              <a:schemeClr val="lt1"/>
+            </a:fontRef>
+          </p:style>
+        </p:sp>
+        <p:sp>
+          <p:nvSpPr>
+            <p:cNvPr id="15" name="Isosceles Triangle 14">
+              <a:extLst>
+                <a:ext uri="{FF2B5EF4-FFF2-40B4-BE49-F238E27FC236}">
+                  <a16:creationId xmlns:a16="http://schemas.microsoft.com/office/drawing/2014/main" id="{1D2B8B50-3419-41ED-9A9F-3CF9EEBBD3F2}"/>
+                </a:ext>
+                <a:ext uri="{C183D7F6-B498-43B3-948B-1728B52AA6E4}">
+                  <adec:decorative xmlns:adec="http://schemas.microsoft.com/office/drawing/2017/decorative" val="1"/>
+                </a:ext>
+              </a:extLst>
+            </p:cNvPr>
+            <p:cNvSpPr/>
+            <p:nvPr>
+              <p:extLst>
+                <p:ext uri="{386F3935-93C4-4BCD-93E2-E3B085C9AB24}">
+                  <p16:designElem xmlns:p16="http://schemas.microsoft.com/office/powerpoint/2015/main" val="1"/>
+                </p:ext>
+              </p:extLst>
+            </p:nvPr>
+          </p:nvSpPr>
+          <p:spPr>
+            <a:xfrm>
+              <a:off x="8932333" y="3048000"/>
+              <a:ext cx="3259667" cy="3810000"/>
+            </a:xfrm>
+            <a:prstGeom prst="triangle">
+              <a:avLst>
+                <a:gd name="adj" fmla="val 100000"/>
+              </a:avLst>
+            </a:prstGeom>
+            <a:solidFill>
+              <a:schemeClr val="accent2">
+                <a:alpha val="72000"/>
+              </a:schemeClr>
+            </a:solidFill>
+            <a:ln>
+              <a:noFill/>
+            </a:ln>
+            <a:effectLst/>
+          </p:spPr>
+          <p:style>
+            <a:lnRef idx="1">
+              <a:schemeClr val="accent1"/>
+            </a:lnRef>
+            <a:fillRef idx="3">
+              <a:schemeClr val="accent1"/>
+            </a:fillRef>
+            <a:effectRef idx="2">
+              <a:schemeClr val="accent1"/>
+            </a:effectRef>
+            <a:fontRef idx="minor">
+              <a:schemeClr val="lt1"/>
+            </a:fontRef>
+          </p:style>
+        </p:sp>
+        <p:sp>
+          <p:nvSpPr>
+            <p:cNvPr id="16" name="Rectangle 27">
+              <a:extLst>
+                <a:ext uri="{FF2B5EF4-FFF2-40B4-BE49-F238E27FC236}">
+                  <a16:creationId xmlns:a16="http://schemas.microsoft.com/office/drawing/2014/main" id="{5C640498-2E73-4FA2-BEB6-C3596A458C8A}"/>
+                </a:ext>
+                <a:ext uri="{C183D7F6-B498-43B3-948B-1728B52AA6E4}">
+                  <adec:decorative xmlns:adec="http://schemas.microsoft.com/office/drawing/2017/decorative" val="1"/>
+                </a:ext>
+              </a:extLst>
+            </p:cNvPr>
+            <p:cNvSpPr/>
+            <p:nvPr>
+              <p:extLst>
+                <p:ext uri="{386F3935-93C4-4BCD-93E2-E3B085C9AB24}">
+                  <p16:designElem xmlns:p16="http://schemas.microsoft.com/office/powerpoint/2015/main" val="1"/>
+                </p:ext>
+              </p:extLst>
+            </p:nvPr>
+          </p:nvSpPr>
+          <p:spPr>
+            <a:xfrm>
+              <a:off x="9334500" y="-8467"/>
+              <a:ext cx="2854326" cy="6866467"/>
+            </a:xfrm>
+            <a:custGeom>
+              <a:avLst/>
+              <a:gdLst/>
+              <a:ahLst/>
+              <a:cxnLst/>
+              <a:rect l="l" t="t" r="r" b="b"/>
+              <a:pathLst>
+                <a:path w="2858013" h="6866467">
+                  <a:moveTo>
+                    <a:pt x="0" y="0"/>
+                  </a:moveTo>
+                  <a:lnTo>
+                    <a:pt x="2858013" y="0"/>
+                  </a:lnTo>
+                  <a:lnTo>
+                    <a:pt x="2858013" y="6866467"/>
+                  </a:lnTo>
+                  <a:lnTo>
+                    <a:pt x="2473942" y="6866467"/>
+                  </a:lnTo>
+                  <a:lnTo>
+                    <a:pt x="0" y="0"/>
+                  </a:lnTo>
+                  <a:close/>
+                </a:path>
+              </a:pathLst>
+            </a:custGeom>
+            <a:solidFill>
+              <a:schemeClr val="accent2">
+                <a:lumMod val="75000"/>
+                <a:alpha val="70000"/>
+              </a:schemeClr>
+            </a:solidFill>
+            <a:ln>
+              <a:noFill/>
+            </a:ln>
+            <a:effectLst/>
+          </p:spPr>
+          <p:style>
+            <a:lnRef idx="1">
+              <a:schemeClr val="accent1"/>
+            </a:lnRef>
+            <a:fillRef idx="3">
+              <a:schemeClr val="accent1"/>
+            </a:fillRef>
+            <a:effectRef idx="2">
+              <a:schemeClr val="accent1"/>
+            </a:effectRef>
+            <a:fontRef idx="minor">
+              <a:schemeClr val="lt1"/>
+            </a:fontRef>
+          </p:style>
+        </p:sp>
+        <p:sp>
+          <p:nvSpPr>
+            <p:cNvPr id="17" name="Rectangle 28">
+              <a:extLst>
+                <a:ext uri="{FF2B5EF4-FFF2-40B4-BE49-F238E27FC236}">
+                  <a16:creationId xmlns:a16="http://schemas.microsoft.com/office/drawing/2014/main" id="{3240EEFC-4112-4C39-A816-C815774F6D69}"/>
+                </a:ext>
+                <a:ext uri="{C183D7F6-B498-43B3-948B-1728B52AA6E4}">
+                  <adec:decorative xmlns:adec="http://schemas.microsoft.com/office/drawing/2017/decorative" val="1"/>
+                </a:ext>
+              </a:extLst>
+            </p:cNvPr>
+            <p:cNvSpPr/>
+            <p:nvPr>
+              <p:extLst>
+                <p:ext uri="{386F3935-93C4-4BCD-93E2-E3B085C9AB24}">
+                  <p16:designElem xmlns:p16="http://schemas.microsoft.com/office/powerpoint/2015/main" val="1"/>
+                </p:ext>
+              </p:extLst>
+            </p:nvPr>
+          </p:nvSpPr>
+          <p:spPr>
+            <a:xfrm>
+              <a:off x="10898730" y="-8467"/>
+              <a:ext cx="1290094" cy="6866467"/>
+            </a:xfrm>
+            <a:custGeom>
+              <a:avLst/>
+              <a:gdLst/>
+              <a:ahLst/>
+              <a:cxnLst/>
+              <a:rect l="l" t="t" r="r" b="b"/>
+              <a:pathLst>
+                <a:path w="1290094" h="6858000">
+                  <a:moveTo>
+                    <a:pt x="1019735" y="0"/>
+                  </a:moveTo>
+                  <a:lnTo>
+                    <a:pt x="1290094" y="0"/>
+                  </a:lnTo>
+                  <a:lnTo>
+                    <a:pt x="1290094" y="6858000"/>
+                  </a:lnTo>
+                  <a:lnTo>
+                    <a:pt x="0" y="6858000"/>
+                  </a:lnTo>
+                  <a:lnTo>
+                    <a:pt x="1019735" y="0"/>
+                  </a:lnTo>
+                  <a:close/>
+                </a:path>
+              </a:pathLst>
+            </a:custGeom>
+            <a:solidFill>
+              <a:schemeClr val="accent1">
+                <a:lumMod val="60000"/>
+                <a:lumOff val="40000"/>
+                <a:alpha val="70000"/>
+              </a:schemeClr>
+            </a:solidFill>
+            <a:ln>
+              <a:noFill/>
+            </a:ln>
+            <a:effectLst/>
+          </p:spPr>
+          <p:style>
+            <a:lnRef idx="1">
+              <a:schemeClr val="accent1"/>
+            </a:lnRef>
+            <a:fillRef idx="3">
+              <a:schemeClr val="accent1"/>
+            </a:fillRef>
+            <a:effectRef idx="2">
+              <a:schemeClr val="accent1"/>
+            </a:effectRef>
+            <a:fontRef idx="minor">
+              <a:schemeClr val="lt1"/>
+            </a:fontRef>
+          </p:style>
+        </p:sp>
+        <p:sp>
+          <p:nvSpPr>
+            <p:cNvPr id="18" name="Rectangle 29">
+              <a:extLst>
+                <a:ext uri="{FF2B5EF4-FFF2-40B4-BE49-F238E27FC236}">
+                  <a16:creationId xmlns:a16="http://schemas.microsoft.com/office/drawing/2014/main" id="{ADF362B0-03EA-4800-9FAA-9F128587E428}"/>
+                </a:ext>
+                <a:ext uri="{C183D7F6-B498-43B3-948B-1728B52AA6E4}">
+                  <adec:decorative xmlns:adec="http://schemas.microsoft.com/office/drawing/2017/decorative" val="1"/>
+                </a:ext>
+              </a:extLst>
+            </p:cNvPr>
+            <p:cNvSpPr/>
+            <p:nvPr>
+              <p:extLst>
+                <p:ext uri="{386F3935-93C4-4BCD-93E2-E3B085C9AB24}">
+                  <p16:designElem xmlns:p16="http://schemas.microsoft.com/office/powerpoint/2015/main" val="1"/>
+                </p:ext>
+              </p:extLst>
+            </p:nvPr>
+          </p:nvSpPr>
+          <p:spPr>
+            <a:xfrm>
+              <a:off x="10938999" y="-8467"/>
+              <a:ext cx="1249825" cy="6866467"/>
+            </a:xfrm>
+            <a:custGeom>
+              <a:avLst/>
+              <a:gdLst/>
+              <a:ahLst/>
+              <a:cxnLst/>
+              <a:rect l="l" t="t" r="r" b="b"/>
+              <a:pathLst>
+                <a:path w="1249825" h="6858000">
+                  <a:moveTo>
+                    <a:pt x="0" y="0"/>
+                  </a:moveTo>
+                  <a:lnTo>
+                    <a:pt x="1249825" y="0"/>
+                  </a:lnTo>
+                  <a:lnTo>
+                    <a:pt x="1249825" y="6858000"/>
+                  </a:lnTo>
+                  <a:lnTo>
+                    <a:pt x="1109382" y="6858000"/>
+                  </a:lnTo>
+                  <a:lnTo>
+                    <a:pt x="0" y="0"/>
+                  </a:lnTo>
+                  <a:close/>
+                </a:path>
+              </a:pathLst>
+            </a:custGeom>
+            <a:solidFill>
+              <a:schemeClr val="accent1">
+                <a:alpha val="65000"/>
+              </a:schemeClr>
+            </a:solidFill>
+            <a:ln>
+              <a:noFill/>
+            </a:ln>
+            <a:effectLst/>
+          </p:spPr>
+          <p:style>
+            <a:lnRef idx="1">
+              <a:schemeClr val="accent1"/>
+            </a:lnRef>
+            <a:fillRef idx="3">
+              <a:schemeClr val="accent1"/>
+            </a:fillRef>
+            <a:effectRef idx="2">
+              <a:schemeClr val="accent1"/>
+            </a:effectRef>
+            <a:fontRef idx="minor">
+              <a:schemeClr val="lt1"/>
+            </a:fontRef>
+          </p:style>
+        </p:sp>
+        <p:sp>
+          <p:nvSpPr>
+            <p:cNvPr id="19" name="Isosceles Triangle 18">
+              <a:extLst>
+                <a:ext uri="{FF2B5EF4-FFF2-40B4-BE49-F238E27FC236}">
+                  <a16:creationId xmlns:a16="http://schemas.microsoft.com/office/drawing/2014/main" id="{0BA84559-2F4C-4795-9246-4C563F942DB9}"/>
+                </a:ext>
+                <a:ext uri="{C183D7F6-B498-43B3-948B-1728B52AA6E4}">
+                  <adec:decorative xmlns:adec="http://schemas.microsoft.com/office/drawing/2017/decorative" val="1"/>
+                </a:ext>
+              </a:extLst>
+            </p:cNvPr>
+            <p:cNvSpPr/>
+            <p:nvPr>
+              <p:extLst>
+                <p:ext uri="{386F3935-93C4-4BCD-93E2-E3B085C9AB24}">
+                  <p16:designElem xmlns:p16="http://schemas.microsoft.com/office/powerpoint/2015/main" val="1"/>
+                </p:ext>
+              </p:extLst>
+            </p:nvPr>
+          </p:nvSpPr>
+          <p:spPr>
+            <a:xfrm>
+              <a:off x="10371666" y="3589867"/>
+              <a:ext cx="1817159" cy="3268133"/>
+            </a:xfrm>
+            <a:prstGeom prst="triangle">
+              <a:avLst>
+                <a:gd name="adj" fmla="val 100000"/>
+              </a:avLst>
+            </a:prstGeom>
+            <a:solidFill>
+              <a:schemeClr val="accent1">
+                <a:alpha val="80000"/>
+              </a:schemeClr>
+            </a:solidFill>
+            <a:ln>
+              <a:noFill/>
+            </a:ln>
+            <a:effectLst/>
+          </p:spPr>
+          <p:style>
+            <a:lnRef idx="1">
+              <a:schemeClr val="accent1"/>
+            </a:lnRef>
+            <a:fillRef idx="3">
+              <a:schemeClr val="accent1"/>
+            </a:fillRef>
+            <a:effectRef idx="2">
+              <a:schemeClr val="accent1"/>
+            </a:effectRef>
+            <a:fontRef idx="minor">
+              <a:schemeClr val="lt1"/>
+            </a:fontRef>
+          </p:style>
+        </p:sp>
+        <p:sp>
+          <p:nvSpPr>
+            <p:cNvPr id="20" name="Isosceles Triangle 19">
+              <a:extLst>
+                <a:ext uri="{FF2B5EF4-FFF2-40B4-BE49-F238E27FC236}">
+                  <a16:creationId xmlns:a16="http://schemas.microsoft.com/office/drawing/2014/main" id="{FA77A1AA-CA47-4A91-A0A1-0A8CE31A985E}"/>
+                </a:ext>
+                <a:ext uri="{C183D7F6-B498-43B3-948B-1728B52AA6E4}">
+                  <adec:decorative xmlns:adec="http://schemas.microsoft.com/office/drawing/2017/decorative" val="1"/>
+                </a:ext>
+              </a:extLst>
+            </p:cNvPr>
+            <p:cNvSpPr/>
+            <p:nvPr>
+              <p:extLst>
+                <p:ext uri="{386F3935-93C4-4BCD-93E2-E3B085C9AB24}">
+                  <p16:designElem xmlns:p16="http://schemas.microsoft.com/office/powerpoint/2015/main" val="1"/>
+                </p:ext>
+              </p:extLst>
+            </p:nvPr>
+          </p:nvSpPr>
+          <p:spPr>
+            <a:xfrm>
+              <a:off x="0" y="4013200"/>
+              <a:ext cx="448733" cy="2844800"/>
+            </a:xfrm>
+            <a:prstGeom prst="triangle">
+              <a:avLst>
+                <a:gd name="adj" fmla="val 0"/>
+              </a:avLst>
+            </a:prstGeom>
+            <a:solidFill>
+              <a:schemeClr val="accent1">
+                <a:alpha val="85000"/>
+              </a:schemeClr>
+            </a:solidFill>
+            <a:ln>
+              <a:noFill/>
+            </a:ln>
+            <a:effectLst/>
+          </p:spPr>
+          <p:style>
+            <a:lnRef idx="1">
+              <a:schemeClr val="accent1"/>
+            </a:lnRef>
+            <a:fillRef idx="3">
+              <a:schemeClr val="accent1"/>
+            </a:fillRef>
+            <a:effectRef idx="2">
+              <a:schemeClr val="accent1"/>
+            </a:effectRef>
+            <a:fontRef idx="minor">
+              <a:schemeClr val="lt1"/>
+            </a:fontRef>
+          </p:style>
+        </p:sp>
+      </p:grpSp>
+      <p:sp>
+        <p:nvSpPr>
+          <p:cNvPr id="38" name="Rectangle 21">
+            <a:extLst>
+              <a:ext uri="{FF2B5EF4-FFF2-40B4-BE49-F238E27FC236}">
+                <a16:creationId xmlns:a16="http://schemas.microsoft.com/office/drawing/2014/main" id="{03E8462A-FEBA-4848-81CC-3F8DA3E477BE}"/>
+              </a:ext>
+              <a:ext uri="{C183D7F6-B498-43B3-948B-1728B52AA6E4}">
+                <adec:decorative xmlns:adec="http://schemas.microsoft.com/office/drawing/2017/decorative" val="1"/>
+              </a:ext>
+            </a:extLst>
+          </p:cNvPr>
+          <p:cNvSpPr>
+            <a:spLocks noGrp="1" noRot="1" noChangeAspect="1" noMove="1" noResize="1" noEditPoints="1" noAdjustHandles="1" noChangeArrowheads="1" noChangeShapeType="1" noTextEdit="1"/>
+          </p:cNvSpPr>
+          <p:nvPr>
+            <p:extLst>
+              <p:ext uri="{386F3935-93C4-4BCD-93E2-E3B085C9AB24}">
+                <p16:designElem xmlns:p16="http://schemas.microsoft.com/office/powerpoint/2015/main" val="1"/>
+              </p:ext>
+            </p:extLst>
+          </p:nvPr>
+        </p:nvSpPr>
+        <p:spPr>
+          <a:xfrm>
+            <a:off x="0" y="0"/>
+            <a:ext cx="12188952" cy="6858000"/>
+          </a:xfrm>
+          <a:prstGeom prst="rect">
+            <a:avLst/>
+          </a:prstGeom>
+          <a:solidFill>
+            <a:schemeClr val="accent2"/>
+          </a:solidFill>
+          <a:ln>
+            <a:noFill/>
+          </a:ln>
+        </p:spPr>
+        <p:style>
+          <a:lnRef idx="2">
+            <a:schemeClr val="accent1">
+              <a:shade val="50000"/>
+            </a:schemeClr>
+          </a:lnRef>
+          <a:fillRef idx="1">
+            <a:schemeClr val="accent1"/>
+          </a:fillRef>
+          <a:effectRef idx="0">
+            <a:schemeClr val="accent1"/>
+          </a:effectRef>
+          <a:fontRef idx="minor">
+            <a:schemeClr val="lt1"/>
+          </a:fontRef>
+        </p:style>
+        <p:txBody>
+          <a:bodyPr rtlCol="0" anchor="ctr"/>
+          <a:lstStyle/>
+          <a:p>
+            <a:pPr algn="ctr"/>
+            <a:endParaRPr lang="en-US"/>
+          </a:p>
+        </p:txBody>
+      </p:sp>
+      <p:grpSp>
+        <p:nvGrpSpPr>
+          <p:cNvPr id="39" name="Group 23">
+            <a:extLst>
+              <a:ext uri="{FF2B5EF4-FFF2-40B4-BE49-F238E27FC236}">
+                <a16:creationId xmlns:a16="http://schemas.microsoft.com/office/drawing/2014/main" id="{2109F83F-40FE-4DB3-84CC-09FB3340D06D}"/>
+              </a:ext>
+              <a:ext uri="{C183D7F6-B498-43B3-948B-1728B52AA6E4}">
+                <adec:decorative xmlns:adec="http://schemas.microsoft.com/office/drawing/2017/decorative" val="1"/>
+              </a:ext>
+            </a:extLst>
+          </p:cNvPr>
+          <p:cNvGrpSpPr>
+            <a:grpSpLocks noGrp="1" noUngrp="1" noRot="1" noChangeAspect="1" noMove="1" noResize="1"/>
+          </p:cNvGrpSpPr>
+          <p:nvPr>
+            <p:extLst>
+              <p:ext uri="{386F3935-93C4-4BCD-93E2-E3B085C9AB24}">
+                <p16:designElem xmlns:p16="http://schemas.microsoft.com/office/powerpoint/2015/main" val="1"/>
+              </p:ext>
+            </p:extLst>
+          </p:nvPr>
+        </p:nvGrpSpPr>
+        <p:grpSpPr>
+          <a:xfrm>
+            <a:off x="0" y="-8467"/>
+            <a:ext cx="12192000" cy="6866467"/>
+            <a:chOff x="0" y="-8467"/>
+            <a:chExt cx="12192000" cy="6866467"/>
+          </a:xfrm>
+        </p:grpSpPr>
+        <p:cxnSp>
+          <p:nvCxnSpPr>
+            <p:cNvPr id="25" name="Straight Connector 24">
+              <a:extLst>
+                <a:ext uri="{FF2B5EF4-FFF2-40B4-BE49-F238E27FC236}">
+                  <a16:creationId xmlns:a16="http://schemas.microsoft.com/office/drawing/2014/main" id="{1DE492D7-C3C3-48FF-80C8-37021EA0262F}"/>
+                </a:ext>
+                <a:ext uri="{C183D7F6-B498-43B3-948B-1728B52AA6E4}">
+                  <adec:decorative xmlns:adec="http://schemas.microsoft.com/office/drawing/2017/decorative" val="1"/>
+                </a:ext>
+              </a:extLst>
+            </p:cNvPr>
+            <p:cNvCxnSpPr/>
+            <p:nvPr>
+              <p:extLst>
+                <p:ext uri="{386F3935-93C4-4BCD-93E2-E3B085C9AB24}">
+                  <p16:designElem xmlns:p16="http://schemas.microsoft.com/office/powerpoint/2015/main" val="1"/>
+                </p:ext>
+              </p:extLst>
+            </p:nvPr>
+          </p:nvCxnSpPr>
+          <p:spPr>
+            <a:xfrm flipH="1">
+              <a:off x="7425267" y="3681413"/>
+              <a:ext cx="4763558" cy="3176587"/>
+            </a:xfrm>
+            <a:prstGeom prst="line">
+              <a:avLst/>
+            </a:prstGeom>
+            <a:ln w="9525">
+              <a:solidFill>
+                <a:schemeClr val="bg1">
+                  <a:lumMod val="85000"/>
+                </a:schemeClr>
+              </a:solidFill>
+            </a:ln>
+          </p:spPr>
+          <p:style>
+            <a:lnRef idx="2">
+              <a:schemeClr val="accent1"/>
+            </a:lnRef>
+            <a:fillRef idx="0">
+              <a:schemeClr val="accent1"/>
+            </a:fillRef>
+            <a:effectRef idx="1">
+              <a:schemeClr val="accent1"/>
+            </a:effectRef>
+            <a:fontRef idx="minor">
+              <a:schemeClr val="tx1"/>
+            </a:fontRef>
+          </p:style>
+        </p:cxnSp>
+        <p:sp>
+          <p:nvSpPr>
+            <p:cNvPr id="26" name="Rectangle 23">
+              <a:extLst>
+                <a:ext uri="{FF2B5EF4-FFF2-40B4-BE49-F238E27FC236}">
+                  <a16:creationId xmlns:a16="http://schemas.microsoft.com/office/drawing/2014/main" id="{0B30FF97-2E9A-490A-AED2-90BA2E0EC17F}"/>
+                </a:ext>
+                <a:ext uri="{C183D7F6-B498-43B3-948B-1728B52AA6E4}">
+                  <adec:decorative xmlns:adec="http://schemas.microsoft.com/office/drawing/2017/decorative" val="1"/>
+                </a:ext>
+              </a:extLst>
+            </p:cNvPr>
+            <p:cNvSpPr/>
+            <p:nvPr>
+              <p:extLst>
+                <p:ext uri="{386F3935-93C4-4BCD-93E2-E3B085C9AB24}">
+                  <p16:designElem xmlns:p16="http://schemas.microsoft.com/office/powerpoint/2015/main" val="1"/>
+                </p:ext>
+              </p:extLst>
+            </p:nvPr>
+          </p:nvSpPr>
+          <p:spPr>
+            <a:xfrm>
+              <a:off x="9181476" y="-8467"/>
+              <a:ext cx="3007349" cy="6866467"/>
+            </a:xfrm>
+            <a:custGeom>
+              <a:avLst/>
+              <a:gdLst/>
+              <a:ahLst/>
+              <a:cxnLst/>
+              <a:rect l="l" t="t" r="r" b="b"/>
+              <a:pathLst>
+                <a:path w="3007349" h="6866467">
+                  <a:moveTo>
+                    <a:pt x="2045532" y="0"/>
+                  </a:moveTo>
+                  <a:lnTo>
+                    <a:pt x="3007349" y="0"/>
+                  </a:lnTo>
+                  <a:lnTo>
+                    <a:pt x="3007349" y="6866467"/>
+                  </a:lnTo>
+                  <a:lnTo>
+                    <a:pt x="0" y="6866467"/>
+                  </a:lnTo>
+                  <a:lnTo>
+                    <a:pt x="2045532" y="0"/>
+                  </a:lnTo>
+                  <a:close/>
+                </a:path>
+              </a:pathLst>
+            </a:custGeom>
+            <a:solidFill>
+              <a:schemeClr val="accent1">
+                <a:alpha val="30000"/>
+              </a:schemeClr>
+            </a:solidFill>
+            <a:ln>
+              <a:noFill/>
+            </a:ln>
+            <a:effectLst/>
+          </p:spPr>
+          <p:style>
+            <a:lnRef idx="1">
+              <a:schemeClr val="accent1"/>
+            </a:lnRef>
+            <a:fillRef idx="3">
+              <a:schemeClr val="accent1"/>
+            </a:fillRef>
+            <a:effectRef idx="2">
+              <a:schemeClr val="accent1"/>
+            </a:effectRef>
+            <a:fontRef idx="minor">
+              <a:schemeClr val="lt1"/>
+            </a:fontRef>
+          </p:style>
+        </p:sp>
+        <p:sp>
+          <p:nvSpPr>
+            <p:cNvPr id="27" name="Rectangle 25">
+              <a:extLst>
+                <a:ext uri="{FF2B5EF4-FFF2-40B4-BE49-F238E27FC236}">
+                  <a16:creationId xmlns:a16="http://schemas.microsoft.com/office/drawing/2014/main" id="{B6D53C7D-A312-47B6-A66A-230A19CFACA6}"/>
+                </a:ext>
+                <a:ext uri="{C183D7F6-B498-43B3-948B-1728B52AA6E4}">
+                  <adec:decorative xmlns:adec="http://schemas.microsoft.com/office/drawing/2017/decorative" val="1"/>
+                </a:ext>
+              </a:extLst>
+            </p:cNvPr>
+            <p:cNvSpPr/>
+            <p:nvPr>
+              <p:extLst>
+                <p:ext uri="{386F3935-93C4-4BCD-93E2-E3B085C9AB24}">
+                  <p16:designElem xmlns:p16="http://schemas.microsoft.com/office/powerpoint/2015/main" val="1"/>
+                </p:ext>
+              </p:extLst>
+            </p:nvPr>
+          </p:nvSpPr>
+          <p:spPr>
+            <a:xfrm>
+              <a:off x="9603442" y="-8467"/>
+              <a:ext cx="2588558" cy="6866467"/>
+            </a:xfrm>
+            <a:custGeom>
+              <a:avLst/>
+              <a:gdLst/>
+              <a:ahLst/>
+              <a:cxnLst/>
+              <a:rect l="l" t="t" r="r" b="b"/>
+              <a:pathLst>
+                <a:path w="2573311" h="6866467">
+                  <a:moveTo>
+                    <a:pt x="0" y="0"/>
+                  </a:moveTo>
+                  <a:lnTo>
+                    <a:pt x="2573311" y="0"/>
+                  </a:lnTo>
+                  <a:lnTo>
+                    <a:pt x="2573311" y="6866467"/>
+                  </a:lnTo>
+                  <a:lnTo>
+                    <a:pt x="1202336" y="6866467"/>
+                  </a:lnTo>
+                  <a:lnTo>
+                    <a:pt x="0" y="0"/>
+                  </a:lnTo>
+                  <a:close/>
+                </a:path>
+              </a:pathLst>
+            </a:custGeom>
+            <a:solidFill>
+              <a:schemeClr val="accent1">
+                <a:alpha val="20000"/>
+              </a:schemeClr>
+            </a:solidFill>
+            <a:ln>
+              <a:noFill/>
+            </a:ln>
+            <a:effectLst/>
+          </p:spPr>
+          <p:style>
+            <a:lnRef idx="1">
+              <a:schemeClr val="accent1"/>
+            </a:lnRef>
+            <a:fillRef idx="3">
+              <a:schemeClr val="accent1"/>
+            </a:fillRef>
+            <a:effectRef idx="2">
+              <a:schemeClr val="accent1"/>
+            </a:effectRef>
+            <a:fontRef idx="minor">
+              <a:schemeClr val="lt1"/>
+            </a:fontRef>
+          </p:style>
+        </p:sp>
+        <p:sp>
+          <p:nvSpPr>
+            <p:cNvPr id="28" name="Isosceles Triangle 27">
+              <a:extLst>
+                <a:ext uri="{FF2B5EF4-FFF2-40B4-BE49-F238E27FC236}">
+                  <a16:creationId xmlns:a16="http://schemas.microsoft.com/office/drawing/2014/main" id="{9329D58C-0D2E-4A2B-AD6A-9CEE506784A8}"/>
+                </a:ext>
+                <a:ext uri="{C183D7F6-B498-43B3-948B-1728B52AA6E4}">
+                  <adec:decorative xmlns:adec="http://schemas.microsoft.com/office/drawing/2017/decorative" val="1"/>
+                </a:ext>
+              </a:extLst>
+            </p:cNvPr>
+            <p:cNvSpPr/>
+            <p:nvPr>
+              <p:extLst>
+                <p:ext uri="{386F3935-93C4-4BCD-93E2-E3B085C9AB24}">
+                  <p16:designElem xmlns:p16="http://schemas.microsoft.com/office/powerpoint/2015/main" val="1"/>
+                </p:ext>
+              </p:extLst>
+            </p:nvPr>
+          </p:nvSpPr>
+          <p:spPr>
+            <a:xfrm>
+              <a:off x="8932333" y="3048000"/>
+              <a:ext cx="3259667" cy="3810000"/>
+            </a:xfrm>
+            <a:prstGeom prst="triangle">
+              <a:avLst>
+                <a:gd name="adj" fmla="val 100000"/>
+              </a:avLst>
+            </a:prstGeom>
+            <a:solidFill>
+              <a:schemeClr val="accent2">
+                <a:alpha val="72000"/>
+              </a:schemeClr>
+            </a:solidFill>
+            <a:ln>
+              <a:noFill/>
+            </a:ln>
+            <a:effectLst/>
+          </p:spPr>
+          <p:style>
+            <a:lnRef idx="1">
+              <a:schemeClr val="accent1"/>
+            </a:lnRef>
+            <a:fillRef idx="3">
+              <a:schemeClr val="accent1"/>
+            </a:fillRef>
+            <a:effectRef idx="2">
+              <a:schemeClr val="accent1"/>
+            </a:effectRef>
+            <a:fontRef idx="minor">
+              <a:schemeClr val="lt1"/>
+            </a:fontRef>
+          </p:style>
+        </p:sp>
+        <p:sp>
+          <p:nvSpPr>
+            <p:cNvPr id="29" name="Rectangle 27">
+              <a:extLst>
+                <a:ext uri="{FF2B5EF4-FFF2-40B4-BE49-F238E27FC236}">
+                  <a16:creationId xmlns:a16="http://schemas.microsoft.com/office/drawing/2014/main" id="{9D446EDE-C690-4461-8BF2-7634808FC8B4}"/>
+                </a:ext>
+                <a:ext uri="{C183D7F6-B498-43B3-948B-1728B52AA6E4}">
+                  <adec:decorative xmlns:adec="http://schemas.microsoft.com/office/drawing/2017/decorative" val="1"/>
+                </a:ext>
+              </a:extLst>
+            </p:cNvPr>
+            <p:cNvSpPr/>
+            <p:nvPr>
+              <p:extLst>
+                <p:ext uri="{386F3935-93C4-4BCD-93E2-E3B085C9AB24}">
+                  <p16:designElem xmlns:p16="http://schemas.microsoft.com/office/powerpoint/2015/main" val="1"/>
+                </p:ext>
+              </p:extLst>
+            </p:nvPr>
+          </p:nvSpPr>
+          <p:spPr>
+            <a:xfrm>
+              <a:off x="9334500" y="-8467"/>
+              <a:ext cx="2854326" cy="6866467"/>
+            </a:xfrm>
+            <a:custGeom>
+              <a:avLst/>
+              <a:gdLst/>
+              <a:ahLst/>
+              <a:cxnLst/>
+              <a:rect l="l" t="t" r="r" b="b"/>
+              <a:pathLst>
+                <a:path w="2858013" h="6866467">
+                  <a:moveTo>
+                    <a:pt x="0" y="0"/>
+                  </a:moveTo>
+                  <a:lnTo>
+                    <a:pt x="2858013" y="0"/>
+                  </a:lnTo>
+                  <a:lnTo>
+                    <a:pt x="2858013" y="6866467"/>
+                  </a:lnTo>
+                  <a:lnTo>
+                    <a:pt x="2473942" y="6866467"/>
+                  </a:lnTo>
+                  <a:lnTo>
+                    <a:pt x="0" y="0"/>
+                  </a:lnTo>
+                  <a:close/>
+                </a:path>
+              </a:pathLst>
+            </a:custGeom>
+            <a:solidFill>
+              <a:schemeClr val="accent2">
+                <a:lumMod val="75000"/>
+                <a:alpha val="70000"/>
+              </a:schemeClr>
+            </a:solidFill>
+            <a:ln>
+              <a:noFill/>
+            </a:ln>
+            <a:effectLst/>
+          </p:spPr>
+          <p:style>
+            <a:lnRef idx="1">
+              <a:schemeClr val="accent1"/>
+            </a:lnRef>
+            <a:fillRef idx="3">
+              <a:schemeClr val="accent1"/>
+            </a:fillRef>
+            <a:effectRef idx="2">
+              <a:schemeClr val="accent1"/>
+            </a:effectRef>
+            <a:fontRef idx="minor">
+              <a:schemeClr val="lt1"/>
+            </a:fontRef>
+          </p:style>
+        </p:sp>
+        <p:sp>
+          <p:nvSpPr>
+            <p:cNvPr id="30" name="Rectangle 28">
+              <a:extLst>
+                <a:ext uri="{FF2B5EF4-FFF2-40B4-BE49-F238E27FC236}">
+                  <a16:creationId xmlns:a16="http://schemas.microsoft.com/office/drawing/2014/main" id="{323F3D34-6531-4AD7-A8C6-195A090281A1}"/>
+                </a:ext>
+                <a:ext uri="{C183D7F6-B498-43B3-948B-1728B52AA6E4}">
+                  <adec:decorative xmlns:adec="http://schemas.microsoft.com/office/drawing/2017/decorative" val="1"/>
+                </a:ext>
+              </a:extLst>
+            </p:cNvPr>
+            <p:cNvSpPr/>
+            <p:nvPr>
+              <p:extLst>
+                <p:ext uri="{386F3935-93C4-4BCD-93E2-E3B085C9AB24}">
+                  <p16:designElem xmlns:p16="http://schemas.microsoft.com/office/powerpoint/2015/main" val="1"/>
+                </p:ext>
+              </p:extLst>
+            </p:nvPr>
+          </p:nvSpPr>
+          <p:spPr>
+            <a:xfrm>
+              <a:off x="10898730" y="-8467"/>
+              <a:ext cx="1290094" cy="6866467"/>
+            </a:xfrm>
+            <a:custGeom>
+              <a:avLst/>
+              <a:gdLst/>
+              <a:ahLst/>
+              <a:cxnLst/>
+              <a:rect l="l" t="t" r="r" b="b"/>
+              <a:pathLst>
+                <a:path w="1290094" h="6858000">
+                  <a:moveTo>
+                    <a:pt x="1019735" y="0"/>
+                  </a:moveTo>
+                  <a:lnTo>
+                    <a:pt x="1290094" y="0"/>
+                  </a:lnTo>
+                  <a:lnTo>
+                    <a:pt x="1290094" y="6858000"/>
+                  </a:lnTo>
+                  <a:lnTo>
+                    <a:pt x="0" y="6858000"/>
+                  </a:lnTo>
+                  <a:lnTo>
+                    <a:pt x="1019735" y="0"/>
+                  </a:lnTo>
+                  <a:close/>
+                </a:path>
+              </a:pathLst>
+            </a:custGeom>
+            <a:solidFill>
+              <a:schemeClr val="accent1">
+                <a:lumMod val="60000"/>
+                <a:lumOff val="40000"/>
+                <a:alpha val="70000"/>
+              </a:schemeClr>
+            </a:solidFill>
+            <a:ln>
+              <a:noFill/>
+            </a:ln>
+            <a:effectLst/>
+          </p:spPr>
+          <p:style>
+            <a:lnRef idx="1">
+              <a:schemeClr val="accent1"/>
+            </a:lnRef>
+            <a:fillRef idx="3">
+              <a:schemeClr val="accent1"/>
+            </a:fillRef>
+            <a:effectRef idx="2">
+              <a:schemeClr val="accent1"/>
+            </a:effectRef>
+            <a:fontRef idx="minor">
+              <a:schemeClr val="lt1"/>
+            </a:fontRef>
+          </p:style>
+        </p:sp>
+        <p:sp>
+          <p:nvSpPr>
+            <p:cNvPr id="31" name="Rectangle 29">
+              <a:extLst>
+                <a:ext uri="{FF2B5EF4-FFF2-40B4-BE49-F238E27FC236}">
+                  <a16:creationId xmlns:a16="http://schemas.microsoft.com/office/drawing/2014/main" id="{B9B0AE3F-2350-435F-A9B0-C310BF876385}"/>
+                </a:ext>
+                <a:ext uri="{C183D7F6-B498-43B3-948B-1728B52AA6E4}">
+                  <adec:decorative xmlns:adec="http://schemas.microsoft.com/office/drawing/2017/decorative" val="1"/>
+                </a:ext>
+              </a:extLst>
+            </p:cNvPr>
+            <p:cNvSpPr/>
+            <p:nvPr>
+              <p:extLst>
+                <p:ext uri="{386F3935-93C4-4BCD-93E2-E3B085C9AB24}">
+                  <p16:designElem xmlns:p16="http://schemas.microsoft.com/office/powerpoint/2015/main" val="1"/>
+                </p:ext>
+              </p:extLst>
+            </p:nvPr>
+          </p:nvSpPr>
+          <p:spPr>
+            <a:xfrm>
+              <a:off x="10938999" y="-8467"/>
+              <a:ext cx="1249825" cy="6866467"/>
+            </a:xfrm>
+            <a:custGeom>
+              <a:avLst/>
+              <a:gdLst/>
+              <a:ahLst/>
+              <a:cxnLst/>
+              <a:rect l="l" t="t" r="r" b="b"/>
+              <a:pathLst>
+                <a:path w="1249825" h="6858000">
+                  <a:moveTo>
+                    <a:pt x="0" y="0"/>
+                  </a:moveTo>
+                  <a:lnTo>
+                    <a:pt x="1249825" y="0"/>
+                  </a:lnTo>
+                  <a:lnTo>
+                    <a:pt x="1249825" y="6858000"/>
+                  </a:lnTo>
+                  <a:lnTo>
+                    <a:pt x="1109382" y="6858000"/>
+                  </a:lnTo>
+                  <a:lnTo>
+                    <a:pt x="0" y="0"/>
+                  </a:lnTo>
+                  <a:close/>
+                </a:path>
+              </a:pathLst>
+            </a:custGeom>
+            <a:solidFill>
+              <a:schemeClr val="accent1">
+                <a:alpha val="65000"/>
+              </a:schemeClr>
+            </a:solidFill>
+            <a:ln>
+              <a:noFill/>
+            </a:ln>
+            <a:effectLst/>
+          </p:spPr>
+          <p:style>
+            <a:lnRef idx="1">
+              <a:schemeClr val="accent1"/>
+            </a:lnRef>
+            <a:fillRef idx="3">
+              <a:schemeClr val="accent1"/>
+            </a:fillRef>
+            <a:effectRef idx="2">
+              <a:schemeClr val="accent1"/>
+            </a:effectRef>
+            <a:fontRef idx="minor">
+              <a:schemeClr val="lt1"/>
+            </a:fontRef>
+          </p:style>
+        </p:sp>
+        <p:sp>
+          <p:nvSpPr>
+            <p:cNvPr id="32" name="Isosceles Triangle 31">
+              <a:extLst>
+                <a:ext uri="{FF2B5EF4-FFF2-40B4-BE49-F238E27FC236}">
+                  <a16:creationId xmlns:a16="http://schemas.microsoft.com/office/drawing/2014/main" id="{4EFA655C-9E50-4C14-A89E-AD7B648E4E2B}"/>
+                </a:ext>
+                <a:ext uri="{C183D7F6-B498-43B3-948B-1728B52AA6E4}">
+                  <adec:decorative xmlns:adec="http://schemas.microsoft.com/office/drawing/2017/decorative" val="1"/>
+                </a:ext>
+              </a:extLst>
+            </p:cNvPr>
+            <p:cNvSpPr/>
+            <p:nvPr>
+              <p:extLst>
+                <p:ext uri="{386F3935-93C4-4BCD-93E2-E3B085C9AB24}">
+                  <p16:designElem xmlns:p16="http://schemas.microsoft.com/office/powerpoint/2015/main" val="1"/>
+                </p:ext>
+              </p:extLst>
+            </p:nvPr>
+          </p:nvSpPr>
+          <p:spPr>
+            <a:xfrm>
+              <a:off x="10371666" y="3589867"/>
+              <a:ext cx="1817159" cy="3268133"/>
+            </a:xfrm>
+            <a:prstGeom prst="triangle">
+              <a:avLst>
+                <a:gd name="adj" fmla="val 100000"/>
+              </a:avLst>
+            </a:prstGeom>
+            <a:solidFill>
+              <a:schemeClr val="accent1">
+                <a:alpha val="80000"/>
+              </a:schemeClr>
+            </a:solidFill>
+            <a:ln>
+              <a:noFill/>
+            </a:ln>
+            <a:effectLst/>
+          </p:spPr>
+          <p:style>
+            <a:lnRef idx="1">
+              <a:schemeClr val="accent1"/>
+            </a:lnRef>
+            <a:fillRef idx="3">
+              <a:schemeClr val="accent1"/>
+            </a:fillRef>
+            <a:effectRef idx="2">
+              <a:schemeClr val="accent1"/>
+            </a:effectRef>
+            <a:fontRef idx="minor">
+              <a:schemeClr val="lt1"/>
+            </a:fontRef>
+          </p:style>
+        </p:sp>
+        <p:sp>
+          <p:nvSpPr>
+            <p:cNvPr id="33" name="Isosceles Triangle 32">
+              <a:extLst>
+                <a:ext uri="{FF2B5EF4-FFF2-40B4-BE49-F238E27FC236}">
+                  <a16:creationId xmlns:a16="http://schemas.microsoft.com/office/drawing/2014/main" id="{3E843863-7D25-4C01-9A17-E817CB6D998A}"/>
+                </a:ext>
+                <a:ext uri="{C183D7F6-B498-43B3-948B-1728B52AA6E4}">
+                  <adec:decorative xmlns:adec="http://schemas.microsoft.com/office/drawing/2017/decorative" val="1"/>
+                </a:ext>
+              </a:extLst>
+            </p:cNvPr>
+            <p:cNvSpPr/>
+            <p:nvPr>
+              <p:extLst>
+                <p:ext uri="{386F3935-93C4-4BCD-93E2-E3B085C9AB24}">
+                  <p16:designElem xmlns:p16="http://schemas.microsoft.com/office/powerpoint/2015/main" val="1"/>
+                </p:ext>
+              </p:extLst>
+            </p:nvPr>
+          </p:nvSpPr>
+          <p:spPr>
+            <a:xfrm>
+              <a:off x="0" y="4013200"/>
+              <a:ext cx="448733" cy="2844800"/>
+            </a:xfrm>
+            <a:prstGeom prst="triangle">
+              <a:avLst>
+                <a:gd name="adj" fmla="val 0"/>
+              </a:avLst>
+            </a:prstGeom>
+            <a:solidFill>
+              <a:schemeClr val="accent1">
+                <a:alpha val="85000"/>
+              </a:schemeClr>
+            </a:solidFill>
+            <a:ln>
+              <a:noFill/>
+            </a:ln>
+            <a:effectLst/>
+          </p:spPr>
+          <p:style>
+            <a:lnRef idx="1">
+              <a:schemeClr val="accent1"/>
+            </a:lnRef>
+            <a:fillRef idx="3">
+              <a:schemeClr val="accent1"/>
+            </a:fillRef>
+            <a:effectRef idx="2">
+              <a:schemeClr val="accent1"/>
+            </a:effectRef>
+            <a:fontRef idx="minor">
+              <a:schemeClr val="lt1"/>
+            </a:fontRef>
+          </p:style>
+        </p:sp>
+      </p:grpSp>
+      <p:sp>
+        <p:nvSpPr>
+          <p:cNvPr id="40" name="Rectangle 34">
+            <a:extLst>
+              <a:ext uri="{FF2B5EF4-FFF2-40B4-BE49-F238E27FC236}">
+                <a16:creationId xmlns:a16="http://schemas.microsoft.com/office/drawing/2014/main" id="{7941F9B1-B01B-4A84-89D9-B169AEB4E456}"/>
+              </a:ext>
+              <a:ext uri="{C183D7F6-B498-43B3-948B-1728B52AA6E4}">
+                <adec:decorative xmlns:adec="http://schemas.microsoft.com/office/drawing/2017/decorative" val="1"/>
+              </a:ext>
+            </a:extLst>
+          </p:cNvPr>
+          <p:cNvSpPr>
+            <a:spLocks noGrp="1" noRot="1" noChangeAspect="1" noMove="1" noResize="1" noEditPoints="1" noAdjustHandles="1" noChangeArrowheads="1" noChangeShapeType="1" noTextEdit="1"/>
+          </p:cNvSpPr>
+          <p:nvPr>
+            <p:extLst>
+              <p:ext uri="{386F3935-93C4-4BCD-93E2-E3B085C9AB24}">
+                <p16:designElem xmlns:p16="http://schemas.microsoft.com/office/powerpoint/2015/main" val="1"/>
+              </p:ext>
+            </p:extLst>
+          </p:nvPr>
+        </p:nvSpPr>
+        <p:spPr>
+          <a:xfrm>
+            <a:off x="477012" y="480060"/>
+            <a:ext cx="11237976" cy="5897880"/>
+          </a:xfrm>
+          <a:prstGeom prst="rect">
+            <a:avLst/>
+          </a:prstGeom>
+          <a:solidFill>
+            <a:srgbClr val="FFFFFF"/>
+          </a:solidFill>
+          <a:ln w="9525">
+            <a:noFill/>
+          </a:ln>
+          <a:effectLst>
+            <a:outerShdw blurRad="63500" dist="17780" dir="5400000" algn="t" rotWithShape="0">
+              <a:prstClr val="black">
+                <a:alpha val="43000"/>
+              </a:prstClr>
+            </a:outerShdw>
+          </a:effectLst>
+        </p:spPr>
+        <p:style>
+          <a:lnRef idx="2">
+            <a:schemeClr val="accent1">
+              <a:shade val="50000"/>
+            </a:schemeClr>
+          </a:lnRef>
+          <a:fillRef idx="1">
+            <a:schemeClr val="accent1"/>
+          </a:fillRef>
+          <a:effectRef idx="0">
+            <a:schemeClr val="accent1"/>
+          </a:effectRef>
+          <a:fontRef idx="minor">
+            <a:schemeClr val="lt1"/>
+          </a:fontRef>
+        </p:style>
+        <p:txBody>
+          <a:bodyPr rtlCol="0" anchor="ctr"/>
+          <a:lstStyle/>
+          <a:p>
+            <a:pPr algn="ctr"/>
+            <a:endParaRPr lang="en-US"/>
+          </a:p>
+        </p:txBody>
+      </p:sp>
+      <p:pic>
+        <p:nvPicPr>
+          <p:cNvPr id="5" name="Picture 4">
+            <a:extLst>
+              <a:ext uri="{FF2B5EF4-FFF2-40B4-BE49-F238E27FC236}">
+                <a16:creationId xmlns:a16="http://schemas.microsoft.com/office/drawing/2014/main" id="{27706FE7-4682-4D7E-BAA3-CBDBBBE921BB}"/>
+              </a:ext>
+            </a:extLst>
+          </p:cNvPr>
+          <p:cNvPicPr>
+            <a:picLocks noChangeAspect="1"/>
+          </p:cNvPicPr>
+          <p:nvPr/>
+        </p:nvPicPr>
+        <p:blipFill>
+          <a:blip r:embed="rId2"/>
+          <a:stretch>
+            <a:fillRect/>
+          </a:stretch>
+        </p:blipFill>
+        <p:spPr>
+          <a:xfrm>
+            <a:off x="1126309" y="1513494"/>
+            <a:ext cx="9941259" cy="3827385"/>
+          </a:xfrm>
+          <a:prstGeom prst="rect">
+            <a:avLst/>
+          </a:prstGeom>
+        </p:spPr>
+      </p:pic>
+    </p:spTree>
+    <p:extLst>
+      <p:ext uri="{BB962C8B-B14F-4D97-AF65-F5344CB8AC3E}">
+        <p14:creationId xmlns:p14="http://schemas.microsoft.com/office/powerpoint/2010/main" val="1918775282"/>
+      </p:ext>
+    </p:extLst>
+  </p:cSld>
+  <p:clrMapOvr>
+    <a:masterClrMapping/>
+  </p:clrMapOvr>
+</p:sld>
+</file>
+
+<file path=ppt/slides/slide12.xml><?xml version="1.0" encoding="utf-8"?>
+<p:sld xmlns:a="http://schemas.openxmlformats.org/drawingml/2006/main" xmlns:r="http://schemas.openxmlformats.org/officeDocument/2006/relationships" xmlns:p="http://schemas.openxmlformats.org/presentationml/2006/main">
+  <p:cSld>
+    <p:spTree>
+      <p:nvGrpSpPr>
+        <p:cNvPr id="1" name=""/>
+        <p:cNvGrpSpPr/>
+        <p:nvPr/>
+      </p:nvGrpSpPr>
+      <p:grpSpPr>
+        <a:xfrm>
+          <a:off x="0" y="0"/>
+          <a:ext cx="0" cy="0"/>
+          <a:chOff x="0" y="0"/>
+          <a:chExt cx="0" cy="0"/>
+        </a:xfrm>
+      </p:grpSpPr>
+      <p:sp>
+        <p:nvSpPr>
+          <p:cNvPr id="2" name="Title 1">
+            <a:extLst>
+              <a:ext uri="{FF2B5EF4-FFF2-40B4-BE49-F238E27FC236}">
+                <a16:creationId xmlns:a16="http://schemas.microsoft.com/office/drawing/2014/main" id="{BD6A7FF9-C61C-4AB9-B5CE-EF51CE9BFCDC}"/>
+              </a:ext>
+            </a:extLst>
+          </p:cNvPr>
+          <p:cNvSpPr>
+            <a:spLocks noGrp="1"/>
+          </p:cNvSpPr>
+          <p:nvPr>
+            <p:ph type="title"/>
+          </p:nvPr>
+        </p:nvSpPr>
+        <p:spPr/>
+        <p:txBody>
+          <a:bodyPr/>
+          <a:lstStyle/>
+          <a:p>
+            <a:r>
+              <a:rPr lang="en-US" dirty="0"/>
+              <a:t>Acceptance Criteria</a:t>
+            </a:r>
+          </a:p>
+        </p:txBody>
+      </p:sp>
+      <p:sp>
+        <p:nvSpPr>
+          <p:cNvPr id="3" name="Content Placeholder 2">
+            <a:extLst>
+              <a:ext uri="{FF2B5EF4-FFF2-40B4-BE49-F238E27FC236}">
+                <a16:creationId xmlns:a16="http://schemas.microsoft.com/office/drawing/2014/main" id="{979491E5-D251-435B-B1E5-049FE9BD4C72}"/>
+              </a:ext>
+            </a:extLst>
+          </p:cNvPr>
+          <p:cNvSpPr>
+            <a:spLocks noGrp="1"/>
+          </p:cNvSpPr>
+          <p:nvPr>
+            <p:ph idx="1"/>
+          </p:nvPr>
+        </p:nvSpPr>
+        <p:spPr/>
+        <p:txBody>
+          <a:bodyPr/>
+          <a:lstStyle/>
+          <a:p>
+            <a:r>
+              <a:rPr lang="en-US" dirty="0"/>
+              <a:t>Root mean squared error will be less than 5.</a:t>
+            </a:r>
+          </a:p>
+          <a:p>
+            <a:r>
+              <a:rPr lang="en-US" dirty="0"/>
+              <a:t>The web page will react user within 5 seconds.</a:t>
+            </a:r>
+          </a:p>
+        </p:txBody>
+      </p:sp>
+    </p:spTree>
+    <p:extLst>
+      <p:ext uri="{BB962C8B-B14F-4D97-AF65-F5344CB8AC3E}">
+        <p14:creationId xmlns:p14="http://schemas.microsoft.com/office/powerpoint/2010/main" val="1593090188"/>
+      </p:ext>
+    </p:extLst>
+  </p:cSld>
+  <p:clrMapOvr>
+    <a:masterClrMapping/>
+  </p:clrMapOvr>
+</p:sld>
+</file>
+
+<file path=ppt/slides/slide13.xml><?xml version="1.0" encoding="utf-8"?>
+<p:sld xmlns:a="http://schemas.openxmlformats.org/drawingml/2006/main" xmlns:r="http://schemas.openxmlformats.org/officeDocument/2006/relationships" xmlns:p="http://schemas.openxmlformats.org/presentationml/2006/main">
+  <p:cSld>
+    <p:spTree>
+      <p:nvGrpSpPr>
+        <p:cNvPr id="1" name=""/>
+        <p:cNvGrpSpPr/>
+        <p:nvPr/>
+      </p:nvGrpSpPr>
+      <p:grpSpPr>
+        <a:xfrm>
+          <a:off x="0" y="0"/>
+          <a:ext cx="0" cy="0"/>
+          <a:chOff x="0" y="0"/>
+          <a:chExt cx="0" cy="0"/>
+        </a:xfrm>
+      </p:grpSpPr>
+      <p:sp>
+        <p:nvSpPr>
+          <p:cNvPr id="2" name="Title 1">
+            <a:extLst>
+              <a:ext uri="{FF2B5EF4-FFF2-40B4-BE49-F238E27FC236}">
                 <a16:creationId xmlns:a16="http://schemas.microsoft.com/office/drawing/2014/main" id="{E910490F-52F2-49E4-A0F6-F618BF163DB4}"/>
               </a:ext>
             </a:extLst>
@@ -8235,7 +10036,7 @@
           <a:p>
             <a:r>
               <a:rPr lang="en-US" dirty="0"/>
-              <a:t>Project Demo</a:t>
+              <a:t>Project Demo – web application</a:t>
             </a:r>
           </a:p>
         </p:txBody>
@@ -8343,7 +10144,7 @@
           <p:cNvPr id="2" name="Title 1">
             <a:extLst>
               <a:ext uri="{FF2B5EF4-FFF2-40B4-BE49-F238E27FC236}">
-                <a16:creationId xmlns:a16="http://schemas.microsoft.com/office/drawing/2014/main" id="{BD6A7FF9-C61C-4AB9-B5CE-EF51CE9BFCDC}"/>
+                <a16:creationId xmlns:a16="http://schemas.microsoft.com/office/drawing/2014/main" id="{28CA6752-C54C-45AF-B016-68AC7834C41E}"/>
               </a:ext>
             </a:extLst>
           </p:cNvPr>
@@ -8361,7 +10162,7 @@
           <a:p>
             <a:r>
               <a:rPr lang="en-US" dirty="0"/>
-              <a:t>Acceptance Criteria</a:t>
+              <a:t>Gradient-Boosted Trees(GBTs)</a:t>
             </a:r>
           </a:p>
         </p:txBody>
@@ -8371,7 +10172,7 @@
           <p:cNvPr id="3" name="Content Placeholder 2">
             <a:extLst>
               <a:ext uri="{FF2B5EF4-FFF2-40B4-BE49-F238E27FC236}">
-                <a16:creationId xmlns:a16="http://schemas.microsoft.com/office/drawing/2014/main" id="{979491E5-D251-435B-B1E5-049FE9BD4C72}"/>
+                <a16:creationId xmlns:a16="http://schemas.microsoft.com/office/drawing/2014/main" id="{8F68AAB9-BBDE-45D6-B459-2980C68F1064}"/>
               </a:ext>
             </a:extLst>
           </p:cNvPr>
@@ -8389,13 +10190,19 @@
           <a:p>
             <a:r>
               <a:rPr lang="en-US" dirty="0"/>
-              <a:t>Root mean squared error will be less than 5.</a:t>
+              <a:t>The general idea of GBTs is to compute a sequence of (very) simple trees, where each successive tree is built for the prediction residuals of the preceding tree.</a:t>
             </a:r>
           </a:p>
           <a:p>
             <a:r>
               <a:rPr lang="en-US" dirty="0"/>
-              <a:t>The web page will react user within 5 seconds.</a:t>
+              <a:t>With a simple binary tree as the beginning, at each step of the boosting (boosting trees algorithm), a simple (best) partitioning of the data is determined, and the deviations of the observed values from the respective means (residuals for each partition) are computed.</a:t>
+            </a:r>
+          </a:p>
+          <a:p>
+            <a:r>
+              <a:rPr lang="en-US" dirty="0"/>
+              <a:t>The next 3-node tree will then be fitted to those residuals, to find another partition that will further reduce the residual (error) variance for the data, given the preceding sequence of trees.</a:t>
             </a:r>
           </a:p>
         </p:txBody>
@@ -8403,7 +10210,7 @@
     </p:spTree>
     <p:extLst>
       <p:ext uri="{BB962C8B-B14F-4D97-AF65-F5344CB8AC3E}">
-        <p14:creationId xmlns:p14="http://schemas.microsoft.com/office/powerpoint/2010/main" val="1593090188"/>
+        <p14:creationId xmlns:p14="http://schemas.microsoft.com/office/powerpoint/2010/main" val="3378858661"/>
       </p:ext>
     </p:extLst>
   </p:cSld>

</xml_diff>